<commit_message>
updated 'familiar with agile' RSVP stats
</commit_message>
<xml_diff>
--- a/Agile Firestarter Winter 2011 Entry Rotation.pptx
+++ b/Agile Firestarter Winter 2011 Entry Rotation.pptx
@@ -224,16 +224,16 @@
                 <c:formatCode>0%</c:formatCode>
                 <c:ptCount val="5"/>
                 <c:pt idx="0">
-                  <c:v>0.26</c:v>
+                  <c:v>0.15</c:v>
                 </c:pt>
                 <c:pt idx="1">
-                  <c:v>0.37</c:v>
+                  <c:v>0.19</c:v>
                 </c:pt>
                 <c:pt idx="2">
-                  <c:v>0.24</c:v>
+                  <c:v>0.34</c:v>
                 </c:pt>
                 <c:pt idx="3">
-                  <c:v>0.04</c:v>
+                  <c:v>0.14000000000000001</c:v>
                 </c:pt>
                 <c:pt idx="4">
                   <c:v>0.1</c:v>
@@ -3833,7 +3833,7 @@
           <p:nvPr>
             <p:extLst>
               <p:ext uri="{D42A27DB-BD31-4B8C-83A1-F6EECF244321}">
-                <p14:modId xmlns:p14="http://schemas.microsoft.com/office/powerpoint/2010/main" val="3682478547"/>
+                <p14:modId xmlns:p14="http://schemas.microsoft.com/office/powerpoint/2010/main" val="2331950477"/>
               </p:ext>
             </p:extLst>
           </p:nvPr>

</xml_diff>

<commit_message>
minor mods made to slides day of the event
</commit_message>
<xml_diff>
--- a/Agile Firestarter Winter 2011 Entry Rotation.pptx
+++ b/Agile Firestarter Winter 2011 Entry Rotation.pptx
@@ -5,7 +5,7 @@
     <p:sldMasterId id="2147483648" r:id="rId1"/>
   </p:sldMasterIdLst>
   <p:notesMasterIdLst>
-    <p:notesMasterId r:id="rId11"/>
+    <p:notesMasterId r:id="rId10"/>
   </p:notesMasterIdLst>
   <p:sldIdLst>
     <p:sldId id="279" r:id="rId2"/>
@@ -13,10 +13,9 @@
     <p:sldId id="285" r:id="rId4"/>
     <p:sldId id="281" r:id="rId5"/>
     <p:sldId id="284" r:id="rId6"/>
-    <p:sldId id="289" r:id="rId7"/>
-    <p:sldId id="288" r:id="rId8"/>
-    <p:sldId id="286" r:id="rId9"/>
-    <p:sldId id="287" r:id="rId10"/>
+    <p:sldId id="288" r:id="rId7"/>
+    <p:sldId id="286" r:id="rId8"/>
+    <p:sldId id="287" r:id="rId9"/>
   </p:sldIdLst>
   <p:sldSz cx="9144000" cy="6858000" type="screen4x3"/>
   <p:notesSz cx="6858000" cy="9144000"/>
@@ -357,7 +356,7 @@
             <a:fld id="{CC9D1E90-0DC1-41C0-86D7-5FF0EBE9F9D3}" type="datetimeFigureOut">
               <a:rPr lang="en-US" smtClean="0"/>
               <a:pPr/>
-              <a:t>1/15/2011</a:t>
+              <a:t>1/22/2011</a:t>
             </a:fld>
             <a:endParaRPr lang="en-US"/>
           </a:p>
@@ -2566,7 +2565,7 @@
             <a:fld id="{F2BCC184-CBE3-4F29-A273-6F4E5CFA4DFC}" type="datetimeFigureOut">
               <a:rPr lang="en-US" smtClean="0"/>
               <a:pPr/>
-              <a:t>1/15/2011</a:t>
+              <a:t>1/22/2011</a:t>
             </a:fld>
             <a:endParaRPr lang="en-US"/>
           </a:p>
@@ -3240,7 +3239,39 @@
                   <a:schemeClr val="bg1"/>
                 </a:solidFill>
               </a:rPr>
-              <a:t>Please sit 6 to 8 people per table!</a:t>
+              <a:t>Please sit </a:t>
+            </a:r>
+            <a:r>
+              <a:rPr lang="en-US" dirty="0" smtClean="0">
+                <a:solidFill>
+                  <a:schemeClr val="bg1"/>
+                </a:solidFill>
+              </a:rPr>
+              <a:t>4 </a:t>
+            </a:r>
+            <a:r>
+              <a:rPr lang="en-US" dirty="0" smtClean="0">
+                <a:solidFill>
+                  <a:schemeClr val="bg1"/>
+                </a:solidFill>
+              </a:rPr>
+              <a:t>to </a:t>
+            </a:r>
+            <a:r>
+              <a:rPr lang="en-US" dirty="0" smtClean="0">
+                <a:solidFill>
+                  <a:schemeClr val="bg1"/>
+                </a:solidFill>
+              </a:rPr>
+              <a:t>5 </a:t>
+            </a:r>
+            <a:r>
+              <a:rPr lang="en-US" dirty="0" smtClean="0">
+                <a:solidFill>
+                  <a:schemeClr val="bg1"/>
+                </a:solidFill>
+              </a:rPr>
+              <a:t>people per table!</a:t>
             </a:r>
           </a:p>
           <a:p>
@@ -3509,7 +3540,7 @@
           <a:p>
             <a:r>
               <a:rPr lang="en-US" dirty="0" smtClean="0"/>
-              <a:t>Download the Files!</a:t>
+              <a:t>No laptop?</a:t>
             </a:r>
             <a:endParaRPr lang="en-US" dirty="0"/>
           </a:p>
@@ -3541,17 +3572,7 @@
                   <a:schemeClr val="bg1"/>
                 </a:solidFill>
               </a:rPr>
-              <a:t>TBD</a:t>
-            </a:r>
-          </a:p>
-          <a:p>
-            <a:r>
-              <a:rPr lang="en-US" sz="2800" dirty="0" smtClean="0">
-                <a:solidFill>
-                  <a:schemeClr val="bg1"/>
-                </a:solidFill>
-              </a:rPr>
-              <a:t>(SSID TBD)</a:t>
+              <a:t>Sit next to someone who brought theirs!</a:t>
             </a:r>
             <a:endParaRPr lang="en-US" sz="2800" dirty="0">
               <a:solidFill>
@@ -3611,7 +3632,7 @@
           <a:p>
             <a:r>
               <a:rPr lang="en-US" dirty="0" smtClean="0"/>
-              <a:t>No laptop?</a:t>
+              <a:t>Silence your Cell Phones!</a:t>
             </a:r>
             <a:endParaRPr lang="en-US" dirty="0"/>
           </a:p>
@@ -3643,7 +3664,7 @@
                   <a:schemeClr val="bg1"/>
                 </a:solidFill>
               </a:rPr>
-              <a:t>Sit next to someone who brought theirs!</a:t>
+              <a:t>There will be periodic breaks during the day for you to phone home and check e-mail!</a:t>
             </a:r>
             <a:endParaRPr lang="en-US" sz="2800" dirty="0">
               <a:solidFill>
@@ -3670,98 +3691,6 @@
 </file>
 
 <file path=ppt/slides/slide8.xml><?xml version="1.0" encoding="utf-8"?>
-<p:sld xmlns:a="http://schemas.openxmlformats.org/drawingml/2006/main" xmlns:r="http://schemas.openxmlformats.org/officeDocument/2006/relationships" xmlns:p="http://schemas.openxmlformats.org/presentationml/2006/main">
-  <p:cSld>
-    <p:spTree>
-      <p:nvGrpSpPr>
-        <p:cNvPr id="1" name=""/>
-        <p:cNvGrpSpPr/>
-        <p:nvPr/>
-      </p:nvGrpSpPr>
-      <p:grpSpPr>
-        <a:xfrm>
-          <a:off x="0" y="0"/>
-          <a:ext cx="0" cy="0"/>
-          <a:chOff x="0" y="0"/>
-          <a:chExt cx="0" cy="0"/>
-        </a:xfrm>
-      </p:grpSpPr>
-      <p:sp>
-        <p:nvSpPr>
-          <p:cNvPr id="2" name="Title 1"/>
-          <p:cNvSpPr>
-            <a:spLocks noGrp="1"/>
-          </p:cNvSpPr>
-          <p:nvPr>
-            <p:ph type="ctrTitle"/>
-          </p:nvPr>
-        </p:nvSpPr>
-        <p:spPr/>
-        <p:txBody>
-          <a:bodyPr/>
-          <a:lstStyle/>
-          <a:p>
-            <a:r>
-              <a:rPr lang="en-US" dirty="0" smtClean="0"/>
-              <a:t>Silence your Cell Phones!</a:t>
-            </a:r>
-            <a:endParaRPr lang="en-US" dirty="0"/>
-          </a:p>
-        </p:txBody>
-      </p:sp>
-      <p:sp>
-        <p:nvSpPr>
-          <p:cNvPr id="3" name="Subtitle 2"/>
-          <p:cNvSpPr>
-            <a:spLocks noGrp="1"/>
-          </p:cNvSpPr>
-          <p:nvPr>
-            <p:ph type="subTitle" idx="1"/>
-          </p:nvPr>
-        </p:nvSpPr>
-        <p:spPr>
-          <a:xfrm>
-            <a:off x="457200" y="4876800"/>
-            <a:ext cx="8077200" cy="1752600"/>
-          </a:xfrm>
-        </p:spPr>
-        <p:txBody>
-          <a:bodyPr/>
-          <a:lstStyle/>
-          <a:p>
-            <a:r>
-              <a:rPr lang="en-US" dirty="0" smtClean="0">
-                <a:solidFill>
-                  <a:schemeClr val="bg1"/>
-                </a:solidFill>
-              </a:rPr>
-              <a:t>There will be periodic breaks during the day for you to phone home and check e-mail!</a:t>
-            </a:r>
-            <a:endParaRPr lang="en-US" sz="2800" dirty="0">
-              <a:solidFill>
-                <a:schemeClr val="bg1"/>
-              </a:solidFill>
-            </a:endParaRPr>
-          </a:p>
-        </p:txBody>
-      </p:sp>
-    </p:spTree>
-  </p:cSld>
-  <p:clrMapOvr>
-    <a:masterClrMapping/>
-  </p:clrMapOvr>
-  <p:transition advClick="0" advTm="15000"/>
-  <p:timing>
-    <p:tnLst>
-      <p:par>
-        <p:cTn id="1" dur="indefinite" restart="never" nodeType="tmRoot"/>
-      </p:par>
-    </p:tnLst>
-  </p:timing>
-</p:sld>
-</file>
-
-<file path=ppt/slides/slide9.xml><?xml version="1.0" encoding="utf-8"?>
 <p:sld xmlns:a="http://schemas.openxmlformats.org/drawingml/2006/main" xmlns:r="http://schemas.openxmlformats.org/officeDocument/2006/relationships" xmlns:p="http://schemas.openxmlformats.org/presentationml/2006/main">
   <p:cSld>
     <p:spTree>

</xml_diff>